<commit_message>
add unit test content
</commit_message>
<xml_diff>
--- a/unit test/Unit test.pptx
+++ b/unit test/Unit test.pptx
@@ -11,6 +11,15 @@
     <p:sldId id="259" r:id="rId5"/>
     <p:sldId id="260" r:id="rId6"/>
     <p:sldId id="261" r:id="rId7"/>
+    <p:sldId id="262" r:id="rId8"/>
+    <p:sldId id="263" r:id="rId9"/>
+    <p:sldId id="264" r:id="rId10"/>
+    <p:sldId id="265" r:id="rId11"/>
+    <p:sldId id="266" r:id="rId12"/>
+    <p:sldId id="267" r:id="rId13"/>
+    <p:sldId id="268" r:id="rId14"/>
+    <p:sldId id="269" r:id="rId15"/>
+    <p:sldId id="270" r:id="rId16"/>
   </p:sldIdLst>
   <p:sldSz cx="12192000" cy="6858000"/>
   <p:notesSz cx="6858000" cy="9144000"/>
@@ -109,6 +118,11 @@
       </a:defRPr>
     </a:lvl9pPr>
   </p:defaultTextStyle>
+  <p:extLst>
+    <p:ext uri="{EFAFB233-063F-42B5-8137-9DF3F51BA10A}">
+      <p15:sldGuideLst xmlns:p15="http://schemas.microsoft.com/office/powerpoint/2012/main"/>
+    </p:ext>
+  </p:extLst>
 </p:presentation>
 </file>
 
@@ -3871,10 +3885,31 @@
         </p:nvSpPr>
         <p:spPr/>
         <p:txBody>
-          <a:bodyPr/>
+          <a:bodyPr>
+            <a:normAutofit/>
+          </a:bodyPr>
           <a:lstStyle/>
           <a:p>
-            <a:endParaRPr lang="en-US"/>
+            <a:r>
+              <a:rPr lang="en-US" dirty="0"/>
+              <a:t>Level Of Testing</a:t>
+            </a:r>
+            <a:r>
+              <a:rPr lang="th-TH" dirty="0"/>
+              <a:t> </a:t>
+            </a:r>
+            <a:r>
+              <a:rPr lang="en-US" dirty="0"/>
+              <a:t>/ Test Objectives</a:t>
+            </a:r>
+            <a:r>
+              <a:rPr lang="th-TH" dirty="0"/>
+              <a:t> </a:t>
+            </a:r>
+            <a:r>
+              <a:rPr lang="en-US" dirty="0"/>
+              <a:t>/ Unit test &amp; TDD</a:t>
+            </a:r>
           </a:p>
         </p:txBody>
       </p:sp>
@@ -3882,6 +3917,751 @@
     <p:extLst>
       <p:ext uri="{BB962C8B-B14F-4D97-AF65-F5344CB8AC3E}">
         <p14:creationId xmlns:p14="http://schemas.microsoft.com/office/powerpoint/2010/main" val="1142455061"/>
+      </p:ext>
+    </p:extLst>
+  </p:cSld>
+  <p:clrMapOvr>
+    <a:masterClrMapping/>
+  </p:clrMapOvr>
+</p:sld>
+</file>
+
+<file path=ppt/slides/slide10.xml><?xml version="1.0" encoding="utf-8"?>
+<p:sld xmlns:a="http://schemas.openxmlformats.org/drawingml/2006/main" xmlns:r="http://schemas.openxmlformats.org/officeDocument/2006/relationships" xmlns:p="http://schemas.openxmlformats.org/presentationml/2006/main">
+  <p:cSld>
+    <p:spTree>
+      <p:nvGrpSpPr>
+        <p:cNvPr id="1" name=""/>
+        <p:cNvGrpSpPr/>
+        <p:nvPr/>
+      </p:nvGrpSpPr>
+      <p:grpSpPr>
+        <a:xfrm>
+          <a:off x="0" y="0"/>
+          <a:ext cx="0" cy="0"/>
+          <a:chOff x="0" y="0"/>
+          <a:chExt cx="0" cy="0"/>
+        </a:xfrm>
+      </p:grpSpPr>
+      <p:sp>
+        <p:nvSpPr>
+          <p:cNvPr id="2" name="Title 1">
+            <a:extLst>
+              <a:ext uri="{FF2B5EF4-FFF2-40B4-BE49-F238E27FC236}">
+                <a16:creationId xmlns:a16="http://schemas.microsoft.com/office/drawing/2014/main" id="{C07D4559-EBEC-4DBC-9DA6-F53155674F96}"/>
+              </a:ext>
+            </a:extLst>
+          </p:cNvPr>
+          <p:cNvSpPr>
+            <a:spLocks noGrp="1"/>
+          </p:cNvSpPr>
+          <p:nvPr>
+            <p:ph type="title"/>
+          </p:nvPr>
+        </p:nvSpPr>
+        <p:spPr/>
+        <p:txBody>
+          <a:bodyPr/>
+          <a:lstStyle/>
+          <a:p>
+            <a:r>
+              <a:rPr lang="en-US" dirty="0"/>
+              <a:t>Unit Test</a:t>
+            </a:r>
+          </a:p>
+        </p:txBody>
+      </p:sp>
+      <p:sp>
+        <p:nvSpPr>
+          <p:cNvPr id="3" name="Content Placeholder 2">
+            <a:extLst>
+              <a:ext uri="{FF2B5EF4-FFF2-40B4-BE49-F238E27FC236}">
+                <a16:creationId xmlns:a16="http://schemas.microsoft.com/office/drawing/2014/main" id="{B710B85B-0FA5-4539-9231-6D3A69528D89}"/>
+              </a:ext>
+            </a:extLst>
+          </p:cNvPr>
+          <p:cNvSpPr>
+            <a:spLocks noGrp="1"/>
+          </p:cNvSpPr>
+          <p:nvPr>
+            <p:ph idx="1"/>
+          </p:nvPr>
+        </p:nvSpPr>
+        <p:spPr/>
+        <p:txBody>
+          <a:bodyPr/>
+          <a:lstStyle/>
+          <a:p>
+            <a:pPr marL="0" indent="0">
+              <a:buNone/>
+            </a:pPr>
+            <a:r>
+              <a:rPr lang="en-US" dirty="0"/>
+              <a:t>“ A </a:t>
+            </a:r>
+            <a:r>
+              <a:rPr lang="en-US" i="1" dirty="0"/>
+              <a:t>unit test </a:t>
+            </a:r>
+            <a:r>
+              <a:rPr lang="en-US" dirty="0"/>
+              <a:t>is a piece of a code (usually a method) that invokes another piece of code and checks the correctness of some assumptions afterward ”</a:t>
+            </a:r>
+          </a:p>
+          <a:p>
+            <a:pPr marL="0" indent="0">
+              <a:buNone/>
+            </a:pPr>
+            <a:endParaRPr lang="en-US" dirty="0"/>
+          </a:p>
+          <a:p>
+            <a:pPr marL="0" indent="0" algn="r">
+              <a:buNone/>
+            </a:pPr>
+            <a:r>
+              <a:rPr lang="en-US" dirty="0"/>
+              <a:t>From The Art Of Unit Testing</a:t>
+            </a:r>
+          </a:p>
+          <a:p>
+            <a:endParaRPr lang="en-US" dirty="0"/>
+          </a:p>
+          <a:p>
+            <a:endParaRPr lang="en-US" dirty="0"/>
+          </a:p>
+          <a:p>
+            <a:endParaRPr lang="en-US" dirty="0"/>
+          </a:p>
+        </p:txBody>
+      </p:sp>
+    </p:spTree>
+    <p:extLst>
+      <p:ext uri="{BB962C8B-B14F-4D97-AF65-F5344CB8AC3E}">
+        <p14:creationId xmlns:p14="http://schemas.microsoft.com/office/powerpoint/2010/main" val="382070220"/>
+      </p:ext>
+    </p:extLst>
+  </p:cSld>
+  <p:clrMapOvr>
+    <a:masterClrMapping/>
+  </p:clrMapOvr>
+</p:sld>
+</file>
+
+<file path=ppt/slides/slide11.xml><?xml version="1.0" encoding="utf-8"?>
+<p:sld xmlns:a="http://schemas.openxmlformats.org/drawingml/2006/main" xmlns:r="http://schemas.openxmlformats.org/officeDocument/2006/relationships" xmlns:p="http://schemas.openxmlformats.org/presentationml/2006/main">
+  <p:cSld>
+    <p:spTree>
+      <p:nvGrpSpPr>
+        <p:cNvPr id="1" name=""/>
+        <p:cNvGrpSpPr/>
+        <p:nvPr/>
+      </p:nvGrpSpPr>
+      <p:grpSpPr>
+        <a:xfrm>
+          <a:off x="0" y="0"/>
+          <a:ext cx="0" cy="0"/>
+          <a:chOff x="0" y="0"/>
+          <a:chExt cx="0" cy="0"/>
+        </a:xfrm>
+      </p:grpSpPr>
+      <p:sp>
+        <p:nvSpPr>
+          <p:cNvPr id="2" name="Title 1">
+            <a:extLst>
+              <a:ext uri="{FF2B5EF4-FFF2-40B4-BE49-F238E27FC236}">
+                <a16:creationId xmlns:a16="http://schemas.microsoft.com/office/drawing/2014/main" id="{3D5AC69C-E13D-4B79-B417-58E3F92E04EF}"/>
+              </a:ext>
+            </a:extLst>
+          </p:cNvPr>
+          <p:cNvSpPr>
+            <a:spLocks noGrp="1"/>
+          </p:cNvSpPr>
+          <p:nvPr>
+            <p:ph type="title"/>
+          </p:nvPr>
+        </p:nvSpPr>
+        <p:spPr/>
+        <p:txBody>
+          <a:bodyPr/>
+          <a:lstStyle/>
+          <a:p>
+            <a:r>
+              <a:rPr lang="en-US" dirty="0"/>
+              <a:t>3A : Arrange, Act, Assert</a:t>
+            </a:r>
+          </a:p>
+        </p:txBody>
+      </p:sp>
+      <p:sp>
+        <p:nvSpPr>
+          <p:cNvPr id="3" name="Content Placeholder 2">
+            <a:extLst>
+              <a:ext uri="{FF2B5EF4-FFF2-40B4-BE49-F238E27FC236}">
+                <a16:creationId xmlns:a16="http://schemas.microsoft.com/office/drawing/2014/main" id="{B1BAB4FD-D6D8-4B27-95C1-A5E1569A2DB0}"/>
+              </a:ext>
+            </a:extLst>
+          </p:cNvPr>
+          <p:cNvSpPr>
+            <a:spLocks noGrp="1"/>
+          </p:cNvSpPr>
+          <p:nvPr>
+            <p:ph idx="1"/>
+          </p:nvPr>
+        </p:nvSpPr>
+        <p:spPr/>
+        <p:txBody>
+          <a:bodyPr/>
+          <a:lstStyle/>
+          <a:p>
+            <a:r>
+              <a:rPr lang="en-US" b="1" dirty="0"/>
+              <a:t>Arrange: </a:t>
+            </a:r>
+            <a:r>
+              <a:rPr lang="en-US" dirty="0"/>
+              <a:t>setup everything needed for the running the tested code. This includes any initialization of dependencies, mocks and data needed for the test to run.</a:t>
+            </a:r>
+          </a:p>
+          <a:p>
+            <a:endParaRPr lang="en-US" dirty="0"/>
+          </a:p>
+          <a:p>
+            <a:r>
+              <a:rPr lang="en-US" b="1" dirty="0"/>
+              <a:t>Act: </a:t>
+            </a:r>
+            <a:r>
+              <a:rPr lang="en-US" dirty="0"/>
+              <a:t>Invoke the code under test.</a:t>
+            </a:r>
+          </a:p>
+          <a:p>
+            <a:endParaRPr lang="en-US" dirty="0"/>
+          </a:p>
+          <a:p>
+            <a:r>
+              <a:rPr lang="en-US" b="1" dirty="0"/>
+              <a:t>Assert:</a:t>
+            </a:r>
+            <a:r>
+              <a:rPr lang="en-US" dirty="0"/>
+              <a:t> Specify the pass criteria for the test, which fails it if not met.</a:t>
+            </a:r>
+          </a:p>
+          <a:p>
+            <a:endParaRPr lang="en-US" dirty="0"/>
+          </a:p>
+          <a:p>
+            <a:endParaRPr lang="en-US" dirty="0"/>
+          </a:p>
+          <a:p>
+            <a:endParaRPr lang="en-US" dirty="0"/>
+          </a:p>
+        </p:txBody>
+      </p:sp>
+    </p:spTree>
+    <p:extLst>
+      <p:ext uri="{BB962C8B-B14F-4D97-AF65-F5344CB8AC3E}">
+        <p14:creationId xmlns:p14="http://schemas.microsoft.com/office/powerpoint/2010/main" val="1235151790"/>
+      </p:ext>
+    </p:extLst>
+  </p:cSld>
+  <p:clrMapOvr>
+    <a:masterClrMapping/>
+  </p:clrMapOvr>
+</p:sld>
+</file>
+
+<file path=ppt/slides/slide12.xml><?xml version="1.0" encoding="utf-8"?>
+<p:sld xmlns:a="http://schemas.openxmlformats.org/drawingml/2006/main" xmlns:r="http://schemas.openxmlformats.org/officeDocument/2006/relationships" xmlns:p="http://schemas.openxmlformats.org/presentationml/2006/main">
+  <p:cSld>
+    <p:spTree>
+      <p:nvGrpSpPr>
+        <p:cNvPr id="1" name=""/>
+        <p:cNvGrpSpPr/>
+        <p:nvPr/>
+      </p:nvGrpSpPr>
+      <p:grpSpPr>
+        <a:xfrm>
+          <a:off x="0" y="0"/>
+          <a:ext cx="0" cy="0"/>
+          <a:chOff x="0" y="0"/>
+          <a:chExt cx="0" cy="0"/>
+        </a:xfrm>
+      </p:grpSpPr>
+      <p:sp>
+        <p:nvSpPr>
+          <p:cNvPr id="2" name="Title 1">
+            <a:extLst>
+              <a:ext uri="{FF2B5EF4-FFF2-40B4-BE49-F238E27FC236}">
+                <a16:creationId xmlns:a16="http://schemas.microsoft.com/office/drawing/2014/main" id="{145E4DC5-C7C7-415B-811F-F21CEA46FE45}"/>
+              </a:ext>
+            </a:extLst>
+          </p:cNvPr>
+          <p:cNvSpPr>
+            <a:spLocks noGrp="1"/>
+          </p:cNvSpPr>
+          <p:nvPr>
+            <p:ph type="title"/>
+          </p:nvPr>
+        </p:nvSpPr>
+        <p:spPr/>
+        <p:txBody>
+          <a:bodyPr/>
+          <a:lstStyle/>
+          <a:p>
+            <a:r>
+              <a:rPr lang="en-US" dirty="0"/>
+              <a:t>Example</a:t>
+            </a:r>
+          </a:p>
+        </p:txBody>
+      </p:sp>
+      <p:pic>
+        <p:nvPicPr>
+          <p:cNvPr id="5" name="Content Placeholder 4">
+            <a:extLst>
+              <a:ext uri="{FF2B5EF4-FFF2-40B4-BE49-F238E27FC236}">
+                <a16:creationId xmlns:a16="http://schemas.microsoft.com/office/drawing/2014/main" id="{EF2A73D4-F5F9-423C-9C05-A676F1FE0AE5}"/>
+              </a:ext>
+            </a:extLst>
+          </p:cNvPr>
+          <p:cNvPicPr>
+            <a:picLocks noGrp="1" noChangeAspect="1"/>
+          </p:cNvPicPr>
+          <p:nvPr>
+            <p:ph idx="1"/>
+          </p:nvPr>
+        </p:nvPicPr>
+        <p:blipFill rotWithShape="1">
+          <a:blip r:embed="rId2"/>
+          <a:srcRect t="2146" b="2156"/>
+          <a:stretch/>
+        </p:blipFill>
+        <p:spPr>
+          <a:xfrm>
+            <a:off x="1660349" y="1935892"/>
+            <a:ext cx="6498534" cy="4664214"/>
+          </a:xfrm>
+        </p:spPr>
+      </p:pic>
+    </p:spTree>
+    <p:extLst>
+      <p:ext uri="{BB962C8B-B14F-4D97-AF65-F5344CB8AC3E}">
+        <p14:creationId xmlns:p14="http://schemas.microsoft.com/office/powerpoint/2010/main" val="3278548390"/>
+      </p:ext>
+    </p:extLst>
+  </p:cSld>
+  <p:clrMapOvr>
+    <a:masterClrMapping/>
+  </p:clrMapOvr>
+</p:sld>
+</file>
+
+<file path=ppt/slides/slide13.xml><?xml version="1.0" encoding="utf-8"?>
+<p:sld xmlns:a="http://schemas.openxmlformats.org/drawingml/2006/main" xmlns:r="http://schemas.openxmlformats.org/officeDocument/2006/relationships" xmlns:p="http://schemas.openxmlformats.org/presentationml/2006/main">
+  <p:cSld>
+    <p:spTree>
+      <p:nvGrpSpPr>
+        <p:cNvPr id="1" name=""/>
+        <p:cNvGrpSpPr/>
+        <p:nvPr/>
+      </p:nvGrpSpPr>
+      <p:grpSpPr>
+        <a:xfrm>
+          <a:off x="0" y="0"/>
+          <a:ext cx="0" cy="0"/>
+          <a:chOff x="0" y="0"/>
+          <a:chExt cx="0" cy="0"/>
+        </a:xfrm>
+      </p:grpSpPr>
+      <p:sp>
+        <p:nvSpPr>
+          <p:cNvPr id="2" name="Title 1">
+            <a:extLst>
+              <a:ext uri="{FF2B5EF4-FFF2-40B4-BE49-F238E27FC236}">
+                <a16:creationId xmlns:a16="http://schemas.microsoft.com/office/drawing/2014/main" id="{551FBF28-7748-4AE0-8DF7-9351034BA411}"/>
+              </a:ext>
+            </a:extLst>
+          </p:cNvPr>
+          <p:cNvSpPr>
+            <a:spLocks noGrp="1"/>
+          </p:cNvSpPr>
+          <p:nvPr>
+            <p:ph type="title"/>
+          </p:nvPr>
+        </p:nvSpPr>
+        <p:spPr/>
+        <p:txBody>
+          <a:bodyPr/>
+          <a:lstStyle/>
+          <a:p>
+            <a:r>
+              <a:rPr lang="en-US" dirty="0"/>
+              <a:t>TDD (Test Driven Development)</a:t>
+            </a:r>
+          </a:p>
+        </p:txBody>
+      </p:sp>
+      <p:sp>
+        <p:nvSpPr>
+          <p:cNvPr id="3" name="Content Placeholder 2">
+            <a:extLst>
+              <a:ext uri="{FF2B5EF4-FFF2-40B4-BE49-F238E27FC236}">
+                <a16:creationId xmlns:a16="http://schemas.microsoft.com/office/drawing/2014/main" id="{640630FC-2F30-40AE-9449-2250C42B8EA6}"/>
+              </a:ext>
+            </a:extLst>
+          </p:cNvPr>
+          <p:cNvSpPr>
+            <a:spLocks noGrp="1"/>
+          </p:cNvSpPr>
+          <p:nvPr>
+            <p:ph idx="1"/>
+          </p:nvPr>
+        </p:nvSpPr>
+        <p:spPr/>
+        <p:txBody>
+          <a:bodyPr/>
+          <a:lstStyle/>
+          <a:p>
+            <a:r>
+              <a:rPr lang="en-US" dirty="0"/>
+              <a:t>	Test driven development (TDD) is an software development approach in which a test is written before writing the code. Once the new code passes the test, it is refactored to an acceptable standard.</a:t>
+            </a:r>
+            <a:endParaRPr lang="th-TH" dirty="0"/>
+          </a:p>
+          <a:p>
+            <a:endParaRPr lang="en-US" dirty="0"/>
+          </a:p>
+        </p:txBody>
+      </p:sp>
+    </p:spTree>
+    <p:extLst>
+      <p:ext uri="{BB962C8B-B14F-4D97-AF65-F5344CB8AC3E}">
+        <p14:creationId xmlns:p14="http://schemas.microsoft.com/office/powerpoint/2010/main" val="2386008549"/>
+      </p:ext>
+    </p:extLst>
+  </p:cSld>
+  <p:clrMapOvr>
+    <a:masterClrMapping/>
+  </p:clrMapOvr>
+</p:sld>
+</file>
+
+<file path=ppt/slides/slide14.xml><?xml version="1.0" encoding="utf-8"?>
+<p:sld xmlns:a="http://schemas.openxmlformats.org/drawingml/2006/main" xmlns:r="http://schemas.openxmlformats.org/officeDocument/2006/relationships" xmlns:p="http://schemas.openxmlformats.org/presentationml/2006/main">
+  <p:cSld>
+    <p:spTree>
+      <p:nvGrpSpPr>
+        <p:cNvPr id="1" name=""/>
+        <p:cNvGrpSpPr/>
+        <p:nvPr/>
+      </p:nvGrpSpPr>
+      <p:grpSpPr>
+        <a:xfrm>
+          <a:off x="0" y="0"/>
+          <a:ext cx="0" cy="0"/>
+          <a:chOff x="0" y="0"/>
+          <a:chExt cx="0" cy="0"/>
+        </a:xfrm>
+      </p:grpSpPr>
+      <p:sp>
+        <p:nvSpPr>
+          <p:cNvPr id="2" name="Title 1">
+            <a:extLst>
+              <a:ext uri="{FF2B5EF4-FFF2-40B4-BE49-F238E27FC236}">
+                <a16:creationId xmlns:a16="http://schemas.microsoft.com/office/drawing/2014/main" id="{4320CE35-139D-4EDA-A56D-9E2AF322D0CE}"/>
+              </a:ext>
+            </a:extLst>
+          </p:cNvPr>
+          <p:cNvSpPr>
+            <a:spLocks noGrp="1"/>
+          </p:cNvSpPr>
+          <p:nvPr>
+            <p:ph type="title"/>
+          </p:nvPr>
+        </p:nvSpPr>
+        <p:spPr/>
+        <p:txBody>
+          <a:bodyPr/>
+          <a:lstStyle/>
+          <a:p>
+            <a:r>
+              <a:rPr lang="en-US" dirty="0"/>
+              <a:t>TDD (Test Driven Development)</a:t>
+            </a:r>
+          </a:p>
+        </p:txBody>
+      </p:sp>
+      <p:sp>
+        <p:nvSpPr>
+          <p:cNvPr id="3" name="Content Placeholder 2">
+            <a:extLst>
+              <a:ext uri="{FF2B5EF4-FFF2-40B4-BE49-F238E27FC236}">
+                <a16:creationId xmlns:a16="http://schemas.microsoft.com/office/drawing/2014/main" id="{74604A8D-8B5A-4B02-8B59-09D04BD9BAF2}"/>
+              </a:ext>
+            </a:extLst>
+          </p:cNvPr>
+          <p:cNvSpPr>
+            <a:spLocks noGrp="1"/>
+          </p:cNvSpPr>
+          <p:nvPr>
+            <p:ph idx="1"/>
+          </p:nvPr>
+        </p:nvSpPr>
+        <p:spPr>
+          <a:xfrm>
+            <a:off x="581192" y="2180496"/>
+            <a:ext cx="11029615" cy="4376823"/>
+          </a:xfrm>
+        </p:spPr>
+        <p:txBody>
+          <a:bodyPr/>
+          <a:lstStyle/>
+          <a:p>
+            <a:r>
+              <a:rPr lang="en-US" dirty="0"/>
+              <a:t>The motto of test-driven development is </a:t>
+            </a:r>
+          </a:p>
+          <a:p>
+            <a:pPr marL="0" indent="0">
+              <a:buNone/>
+            </a:pPr>
+            <a:r>
+              <a:rPr lang="en-US" dirty="0"/>
+              <a:t>"Red, Green, Refactor.“</a:t>
+            </a:r>
+          </a:p>
+          <a:p>
+            <a:endParaRPr lang="en-US" dirty="0"/>
+          </a:p>
+          <a:p>
+            <a:r>
+              <a:rPr lang="en-US" dirty="0">
+                <a:solidFill>
+                  <a:srgbClr val="FF0000"/>
+                </a:solidFill>
+              </a:rPr>
+              <a:t>Red: </a:t>
+            </a:r>
+            <a:r>
+              <a:rPr lang="en-US" dirty="0"/>
+              <a:t>Create a test and make it fail.</a:t>
+            </a:r>
+          </a:p>
+          <a:p>
+            <a:endParaRPr lang="en-US" dirty="0"/>
+          </a:p>
+          <a:p>
+            <a:r>
+              <a:rPr lang="en-US" dirty="0">
+                <a:solidFill>
+                  <a:srgbClr val="00B050"/>
+                </a:solidFill>
+              </a:rPr>
+              <a:t>Green: </a:t>
+            </a:r>
+            <a:r>
+              <a:rPr lang="en-US" dirty="0"/>
+              <a:t>Make the test pass by any means necessary.</a:t>
+            </a:r>
+          </a:p>
+          <a:p>
+            <a:endParaRPr lang="en-US" dirty="0"/>
+          </a:p>
+          <a:p>
+            <a:r>
+              <a:rPr lang="en-US" dirty="0">
+                <a:solidFill>
+                  <a:srgbClr val="FFC000"/>
+                </a:solidFill>
+              </a:rPr>
+              <a:t>Refactor: </a:t>
+            </a:r>
+            <a:r>
+              <a:rPr lang="en-US" dirty="0"/>
+              <a:t>Change the code to remove duplication in your project </a:t>
+            </a:r>
+            <a:br>
+              <a:rPr lang="en-US" dirty="0"/>
+            </a:br>
+            <a:r>
+              <a:rPr lang="en-US" dirty="0"/>
+              <a:t>and to improve the design while ensuring that all tests still pass.</a:t>
+            </a:r>
+          </a:p>
+          <a:p>
+            <a:endParaRPr lang="en-US" dirty="0"/>
+          </a:p>
+          <a:p>
+            <a:endParaRPr lang="en-US" dirty="0"/>
+          </a:p>
+          <a:p>
+            <a:endParaRPr lang="en-US" dirty="0"/>
+          </a:p>
+        </p:txBody>
+      </p:sp>
+      <p:pic>
+        <p:nvPicPr>
+          <p:cNvPr id="4" name="Picture 3" descr="http://quintagroup.com/services/python/test-driven-development/tdd.png">
+            <a:extLst>
+              <a:ext uri="{FF2B5EF4-FFF2-40B4-BE49-F238E27FC236}">
+                <a16:creationId xmlns:a16="http://schemas.microsoft.com/office/drawing/2014/main" id="{10E30479-5B2D-433F-861D-FC3E24C21961}"/>
+              </a:ext>
+            </a:extLst>
+          </p:cNvPr>
+          <p:cNvPicPr>
+            <a:picLocks noChangeAspect="1" noChangeArrowheads="1"/>
+          </p:cNvPicPr>
+          <p:nvPr/>
+        </p:nvPicPr>
+        <p:blipFill>
+          <a:blip r:embed="rId2">
+            <a:extLst>
+              <a:ext uri="{28A0092B-C50C-407E-A947-70E740481C1C}">
+                <a14:useLocalDpi xmlns:a14="http://schemas.microsoft.com/office/drawing/2010/main" val="0"/>
+              </a:ext>
+            </a:extLst>
+          </a:blip>
+          <a:srcRect/>
+          <a:stretch>
+            <a:fillRect/>
+          </a:stretch>
+        </p:blipFill>
+        <p:spPr bwMode="auto">
+          <a:xfrm>
+            <a:off x="7106087" y="2089231"/>
+            <a:ext cx="4504720" cy="3518468"/>
+          </a:xfrm>
+          <a:prstGeom prst="rect">
+            <a:avLst/>
+          </a:prstGeom>
+          <a:noFill/>
+          <a:extLst>
+            <a:ext uri="{909E8E84-426E-40DD-AFC4-6F175D3DCCD1}">
+              <a14:hiddenFill xmlns:a14="http://schemas.microsoft.com/office/drawing/2010/main">
+                <a:solidFill>
+                  <a:srgbClr val="FFFFFF"/>
+                </a:solidFill>
+              </a14:hiddenFill>
+            </a:ext>
+          </a:extLst>
+        </p:spPr>
+      </p:pic>
+    </p:spTree>
+    <p:extLst>
+      <p:ext uri="{BB962C8B-B14F-4D97-AF65-F5344CB8AC3E}">
+        <p14:creationId xmlns:p14="http://schemas.microsoft.com/office/powerpoint/2010/main" val="1916674539"/>
+      </p:ext>
+    </p:extLst>
+  </p:cSld>
+  <p:clrMapOvr>
+    <a:masterClrMapping/>
+  </p:clrMapOvr>
+</p:sld>
+</file>
+
+<file path=ppt/slides/slide15.xml><?xml version="1.0" encoding="utf-8"?>
+<p:sld xmlns:a="http://schemas.openxmlformats.org/drawingml/2006/main" xmlns:r="http://schemas.openxmlformats.org/officeDocument/2006/relationships" xmlns:p="http://schemas.openxmlformats.org/presentationml/2006/main">
+  <p:cSld>
+    <p:spTree>
+      <p:nvGrpSpPr>
+        <p:cNvPr id="1" name=""/>
+        <p:cNvGrpSpPr/>
+        <p:nvPr/>
+      </p:nvGrpSpPr>
+      <p:grpSpPr>
+        <a:xfrm>
+          <a:off x="0" y="0"/>
+          <a:ext cx="0" cy="0"/>
+          <a:chOff x="0" y="0"/>
+          <a:chExt cx="0" cy="0"/>
+        </a:xfrm>
+      </p:grpSpPr>
+      <p:sp>
+        <p:nvSpPr>
+          <p:cNvPr id="2" name="Title 1">
+            <a:extLst>
+              <a:ext uri="{FF2B5EF4-FFF2-40B4-BE49-F238E27FC236}">
+                <a16:creationId xmlns:a16="http://schemas.microsoft.com/office/drawing/2014/main" id="{835A9ABC-41E8-49D1-87A4-0D76CD4759B9}"/>
+              </a:ext>
+            </a:extLst>
+          </p:cNvPr>
+          <p:cNvSpPr>
+            <a:spLocks noGrp="1"/>
+          </p:cNvSpPr>
+          <p:nvPr>
+            <p:ph type="title"/>
+          </p:nvPr>
+        </p:nvSpPr>
+        <p:spPr/>
+        <p:txBody>
+          <a:bodyPr/>
+          <a:lstStyle/>
+          <a:p>
+            <a:r>
+              <a:rPr lang="en-US" dirty="0"/>
+              <a:t>Assignment</a:t>
+            </a:r>
+          </a:p>
+        </p:txBody>
+      </p:sp>
+      <p:sp>
+        <p:nvSpPr>
+          <p:cNvPr id="3" name="Content Placeholder 2">
+            <a:extLst>
+              <a:ext uri="{FF2B5EF4-FFF2-40B4-BE49-F238E27FC236}">
+                <a16:creationId xmlns:a16="http://schemas.microsoft.com/office/drawing/2014/main" id="{06CD0F6D-D1CC-4E5F-BD01-D9B695C453EA}"/>
+              </a:ext>
+            </a:extLst>
+          </p:cNvPr>
+          <p:cNvSpPr>
+            <a:spLocks noGrp="1"/>
+          </p:cNvSpPr>
+          <p:nvPr>
+            <p:ph idx="1"/>
+          </p:nvPr>
+        </p:nvSpPr>
+        <p:spPr/>
+        <p:txBody>
+          <a:bodyPr/>
+          <a:lstStyle/>
+          <a:p>
+            <a:r>
+              <a:rPr lang="en-US" dirty="0"/>
+              <a:t>Create Unit test Project</a:t>
+            </a:r>
+          </a:p>
+          <a:p>
+            <a:r>
+              <a:rPr lang="en-US" dirty="0"/>
+              <a:t>Create class library project </a:t>
+            </a:r>
+          </a:p>
+          <a:p>
+            <a:pPr lvl="1"/>
+            <a:r>
+              <a:rPr lang="en-US" dirty="0"/>
+              <a:t>Create class and implement some methods</a:t>
+            </a:r>
+          </a:p>
+          <a:p>
+            <a:r>
+              <a:rPr lang="en-US" dirty="0"/>
+              <a:t>Write unit test for each methods try to </a:t>
+            </a:r>
+            <a:r>
+              <a:rPr lang="en-US"/>
+              <a:t>coverage case </a:t>
+            </a:r>
+          </a:p>
+        </p:txBody>
+      </p:sp>
+    </p:spTree>
+    <p:extLst>
+      <p:ext uri="{BB962C8B-B14F-4D97-AF65-F5344CB8AC3E}">
+        <p14:creationId xmlns:p14="http://schemas.microsoft.com/office/powerpoint/2010/main" val="478144451"/>
       </p:ext>
     </p:extLst>
   </p:cSld>
@@ -3929,7 +4709,10 @@
           <a:bodyPr/>
           <a:lstStyle/>
           <a:p>
-            <a:endParaRPr lang="en-US"/>
+            <a:r>
+              <a:rPr lang="en-US" dirty="0"/>
+              <a:t>Topic</a:t>
+            </a:r>
           </a:p>
         </p:txBody>
       </p:sp>
@@ -3954,7 +4737,43 @@
           <a:bodyPr/>
           <a:lstStyle/>
           <a:p>
-            <a:endParaRPr lang="en-US"/>
+            <a:r>
+              <a:rPr lang="en-US" dirty="0"/>
+              <a:t>Level Of Testing</a:t>
+            </a:r>
+          </a:p>
+          <a:p>
+            <a:r>
+              <a:rPr lang="en-US" dirty="0"/>
+              <a:t>Test Objectives</a:t>
+            </a:r>
+          </a:p>
+          <a:p>
+            <a:r>
+              <a:rPr lang="en-US" dirty="0"/>
+              <a:t>Unit Test</a:t>
+            </a:r>
+          </a:p>
+          <a:p>
+            <a:r>
+              <a:rPr lang="en-US" dirty="0"/>
+              <a:t>TDD (Test Driven Development)</a:t>
+            </a:r>
+          </a:p>
+          <a:p>
+            <a:r>
+              <a:rPr lang="en-US" dirty="0"/>
+              <a:t>Example</a:t>
+            </a:r>
+          </a:p>
+          <a:p>
+            <a:r>
+              <a:rPr lang="en-US" dirty="0"/>
+              <a:t>Assignment</a:t>
+            </a:r>
+          </a:p>
+          <a:p>
+            <a:endParaRPr lang="en-US" dirty="0"/>
           </a:p>
         </p:txBody>
       </p:sp>
@@ -4009,7 +4828,10 @@
           <a:bodyPr/>
           <a:lstStyle/>
           <a:p>
-            <a:endParaRPr lang="en-US"/>
+            <a:r>
+              <a:rPr lang="en-US" dirty="0"/>
+              <a:t>Level Of  Testing</a:t>
+            </a:r>
           </a:p>
         </p:txBody>
       </p:sp>
@@ -4034,7 +4856,19 @@
           <a:bodyPr/>
           <a:lstStyle/>
           <a:p>
-            <a:endParaRPr lang="en-US"/>
+            <a:r>
+              <a:rPr lang="en-US" dirty="0"/>
+              <a:t>Unit test(white box &amp; black box testing technique) </a:t>
+            </a:r>
+          </a:p>
+          <a:p>
+            <a:r>
+              <a:rPr lang="en-US" dirty="0"/>
+              <a:t>Integration Test (For small size) </a:t>
+            </a:r>
+          </a:p>
+          <a:p>
+            <a:endParaRPr lang="en-US" dirty="0"/>
           </a:p>
         </p:txBody>
       </p:sp>
@@ -4089,7 +4923,10 @@
           <a:bodyPr/>
           <a:lstStyle/>
           <a:p>
-            <a:endParaRPr lang="en-US"/>
+            <a:r>
+              <a:rPr lang="en-US" dirty="0"/>
+              <a:t>Level Of  Testing</a:t>
+            </a:r>
           </a:p>
         </p:txBody>
       </p:sp>
@@ -4109,12 +4946,94 @@
             <p:ph idx="1"/>
           </p:nvPr>
         </p:nvSpPr>
-        <p:spPr/>
-        <p:txBody>
-          <a:bodyPr/>
+        <p:spPr>
+          <a:xfrm>
+            <a:off x="683740" y="2409022"/>
+            <a:ext cx="10733860" cy="4082394"/>
+          </a:xfrm>
+        </p:spPr>
+        <p:txBody>
+          <a:bodyPr>
+            <a:normAutofit fontScale="85000" lnSpcReduction="20000"/>
+          </a:bodyPr>
           <a:lstStyle/>
           <a:p>
-            <a:endParaRPr lang="en-US"/>
+            <a:r>
+              <a:rPr lang="en-US" sz="3200" dirty="0"/>
+              <a:t>System Test </a:t>
+            </a:r>
+          </a:p>
+          <a:p>
+            <a:pPr lvl="1"/>
+            <a:r>
+              <a:rPr lang="en-US" sz="2800" dirty="0"/>
+              <a:t>Functional </a:t>
+            </a:r>
+          </a:p>
+          <a:p>
+            <a:pPr lvl="1"/>
+            <a:r>
+              <a:rPr lang="en-US" sz="2800" dirty="0"/>
+              <a:t>Non-Functional Test </a:t>
+            </a:r>
+          </a:p>
+          <a:p>
+            <a:pPr lvl="2"/>
+            <a:r>
+              <a:rPr lang="en-US" sz="2400" dirty="0"/>
+              <a:t>Performance Test </a:t>
+            </a:r>
+          </a:p>
+          <a:p>
+            <a:pPr lvl="3"/>
+            <a:r>
+              <a:rPr lang="en-US" sz="2000" dirty="0"/>
+              <a:t>Load Test </a:t>
+            </a:r>
+          </a:p>
+          <a:p>
+            <a:pPr lvl="3"/>
+            <a:r>
+              <a:rPr lang="en-US" sz="2000" dirty="0"/>
+              <a:t>Stress Test </a:t>
+            </a:r>
+          </a:p>
+          <a:p>
+            <a:pPr lvl="2"/>
+            <a:r>
+              <a:rPr lang="en-US" sz="2400" dirty="0"/>
+              <a:t>Security Test </a:t>
+            </a:r>
+          </a:p>
+          <a:p>
+            <a:pPr lvl="2"/>
+            <a:r>
+              <a:rPr lang="en-US" sz="2400" dirty="0"/>
+              <a:t>Reliability / Availability Test </a:t>
+            </a:r>
+          </a:p>
+          <a:p>
+            <a:pPr lvl="3"/>
+            <a:r>
+              <a:rPr lang="en-US" sz="2000" dirty="0"/>
+              <a:t>Disaster &amp; Recovery Test (data backup &amp; data recovery Test) </a:t>
+            </a:r>
+          </a:p>
+          <a:p>
+            <a:pPr lvl="3"/>
+            <a:r>
+              <a:rPr lang="en-US" sz="2000" dirty="0"/>
+              <a:t>Horizontal Scalable </a:t>
+            </a:r>
+          </a:p>
+          <a:p>
+            <a:endParaRPr lang="en-US" sz="2400" dirty="0"/>
+          </a:p>
+          <a:p>
+            <a:endParaRPr lang="en-US" sz="2400" dirty="0"/>
+          </a:p>
+          <a:p>
+            <a:endParaRPr lang="en-US" dirty="0"/>
           </a:p>
         </p:txBody>
       </p:sp>
@@ -4169,7 +5088,10 @@
           <a:bodyPr/>
           <a:lstStyle/>
           <a:p>
-            <a:endParaRPr lang="en-US"/>
+            <a:r>
+              <a:rPr lang="en-US" dirty="0"/>
+              <a:t>Level Of  Testing</a:t>
+            </a:r>
           </a:p>
         </p:txBody>
       </p:sp>
@@ -4194,7 +5116,46 @@
           <a:bodyPr/>
           <a:lstStyle/>
           <a:p>
-            <a:endParaRPr lang="en-US"/>
+            <a:r>
+              <a:rPr lang="en-US" sz="2800" dirty="0"/>
+              <a:t>System Integration Test (SIT – For large size) </a:t>
+            </a:r>
+          </a:p>
+          <a:p>
+            <a:pPr lvl="1"/>
+            <a:r>
+              <a:rPr lang="en-US" sz="2400" dirty="0"/>
+              <a:t>End to End Test (E2E) </a:t>
+            </a:r>
+          </a:p>
+          <a:p>
+            <a:r>
+              <a:rPr lang="en-US" sz="2800" dirty="0"/>
+              <a:t>Regression Test </a:t>
+            </a:r>
+          </a:p>
+          <a:p>
+            <a:r>
+              <a:rPr lang="en-US" sz="2800" dirty="0"/>
+              <a:t>User Acceptance Test (UAT) </a:t>
+            </a:r>
+          </a:p>
+          <a:p>
+            <a:pPr lvl="1"/>
+            <a:r>
+              <a:rPr lang="en-US" sz="2400" dirty="0"/>
+              <a:t>Alpha (in-house test) </a:t>
+            </a:r>
+          </a:p>
+          <a:p>
+            <a:pPr lvl="1"/>
+            <a:r>
+              <a:rPr lang="en-US" sz="2400" dirty="0"/>
+              <a:t>Beta</a:t>
+            </a:r>
+          </a:p>
+          <a:p>
+            <a:endParaRPr lang="en-US" dirty="0"/>
           </a:p>
         </p:txBody>
       </p:sp>
@@ -4249,39 +5210,637 @@
           <a:bodyPr/>
           <a:lstStyle/>
           <a:p>
-            <a:endParaRPr lang="en-US"/>
-          </a:p>
-        </p:txBody>
-      </p:sp>
-      <p:sp>
-        <p:nvSpPr>
-          <p:cNvPr id="3" name="Content Placeholder 2">
+            <a:r>
+              <a:rPr lang="en-US" dirty="0"/>
+              <a:t>Level Of  Testing</a:t>
+            </a:r>
+          </a:p>
+        </p:txBody>
+      </p:sp>
+      <p:graphicFrame>
+        <p:nvGraphicFramePr>
+          <p:cNvPr id="4" name="Table 3">
             <a:extLst>
               <a:ext uri="{FF2B5EF4-FFF2-40B4-BE49-F238E27FC236}">
-                <a16:creationId xmlns:a16="http://schemas.microsoft.com/office/drawing/2014/main" id="{FBCA9996-532F-46C8-98EF-256625162F16}"/>
+                <a16:creationId xmlns:a16="http://schemas.microsoft.com/office/drawing/2014/main" id="{2E5CA8E1-AA94-45B7-9EA1-2B832C924EE4}"/>
               </a:ext>
             </a:extLst>
           </p:cNvPr>
-          <p:cNvSpPr>
-            <a:spLocks noGrp="1"/>
-          </p:cNvSpPr>
-          <p:nvPr>
-            <p:ph idx="1"/>
-          </p:nvPr>
-        </p:nvSpPr>
-        <p:spPr/>
-        <p:txBody>
-          <a:bodyPr/>
-          <a:lstStyle/>
-          <a:p>
-            <a:endParaRPr lang="en-US"/>
-          </a:p>
-        </p:txBody>
-      </p:sp>
+          <p:cNvGraphicFramePr>
+            <a:graphicFrameLocks noGrp="1"/>
+          </p:cNvGraphicFramePr>
+          <p:nvPr/>
+        </p:nvGraphicFramePr>
+        <p:xfrm>
+          <a:off x="581025" y="2335213"/>
+          <a:ext cx="10986830" cy="4328160"/>
+        </p:xfrm>
+        <a:graphic>
+          <a:graphicData uri="http://schemas.openxmlformats.org/drawingml/2006/table">
+            <a:tbl>
+              <a:tblPr firstRow="1" bandRow="1">
+                <a:tableStyleId>{5C22544A-7EE6-4342-B048-85BDC9FD1C3A}</a:tableStyleId>
+              </a:tblPr>
+              <a:tblGrid>
+                <a:gridCol w="3124199">
+                  <a:extLst>
+                    <a:ext uri="{9D8B030D-6E8A-4147-A177-3AD203B41FA5}">
+                      <a16:colId xmlns:a16="http://schemas.microsoft.com/office/drawing/2014/main" val="1034231852"/>
+                    </a:ext>
+                  </a:extLst>
+                </a:gridCol>
+                <a:gridCol w="7862631">
+                  <a:extLst>
+                    <a:ext uri="{9D8B030D-6E8A-4147-A177-3AD203B41FA5}">
+                      <a16:colId xmlns:a16="http://schemas.microsoft.com/office/drawing/2014/main" val="2937856203"/>
+                    </a:ext>
+                  </a:extLst>
+                </a:gridCol>
+              </a:tblGrid>
+              <a:tr h="370840">
+                <a:tc>
+                  <a:txBody>
+                    <a:bodyPr/>
+                    <a:lstStyle/>
+                    <a:p>
+                      <a:pPr algn="l" fontAlgn="t"/>
+                      <a:r>
+                        <a:rPr lang="en-US" dirty="0">
+                          <a:effectLst/>
+                        </a:rPr>
+                        <a:t>Level</a:t>
+                      </a:r>
+                    </a:p>
+                  </a:txBody>
+                  <a:tcPr marL="76200" marR="76200" marT="76200" marB="76200"/>
+                </a:tc>
+                <a:tc>
+                  <a:txBody>
+                    <a:bodyPr/>
+                    <a:lstStyle/>
+                    <a:p>
+                      <a:pPr algn="l" fontAlgn="t"/>
+                      <a:r>
+                        <a:rPr lang="en-US">
+                          <a:effectLst/>
+                        </a:rPr>
+                        <a:t>Summary</a:t>
+                      </a:r>
+                    </a:p>
+                  </a:txBody>
+                  <a:tcPr marL="76200" marR="76200" marT="76200" marB="76200"/>
+                </a:tc>
+                <a:extLst>
+                  <a:ext uri="{0D108BD9-81ED-4DB2-BD59-A6C34878D82A}">
+                    <a16:rowId xmlns:a16="http://schemas.microsoft.com/office/drawing/2014/main" val="886012410"/>
+                  </a:ext>
+                </a:extLst>
+              </a:tr>
+              <a:tr h="370840">
+                <a:tc>
+                  <a:txBody>
+                    <a:bodyPr/>
+                    <a:lstStyle/>
+                    <a:p>
+                      <a:pPr fontAlgn="t"/>
+                      <a:r>
+                        <a:rPr lang="en-US" u="none" strike="noStrike" dirty="0">
+                          <a:solidFill>
+                            <a:srgbClr val="1E73BE"/>
+                          </a:solidFill>
+                          <a:effectLst/>
+                          <a:hlinkClick r:id="rId2"/>
+                        </a:rPr>
+                        <a:t>Unit Testing</a:t>
+                      </a:r>
+                      <a:endParaRPr lang="en-US" dirty="0">
+                        <a:effectLst/>
+                      </a:endParaRPr>
+                    </a:p>
+                  </a:txBody>
+                  <a:tcPr marL="76200" marR="76200" marT="76200" marB="76200"/>
+                </a:tc>
+                <a:tc>
+                  <a:txBody>
+                    <a:bodyPr/>
+                    <a:lstStyle/>
+                    <a:p>
+                      <a:pPr fontAlgn="t"/>
+                      <a:r>
+                        <a:rPr lang="en-US">
+                          <a:effectLst/>
+                        </a:rPr>
+                        <a:t>A level of the software testing process where individual units of a software are tested. The purpose is to validate that each unit of the software performs as designed.</a:t>
+                      </a:r>
+                    </a:p>
+                  </a:txBody>
+                  <a:tcPr marL="76200" marR="76200" marT="76200" marB="76200"/>
+                </a:tc>
+                <a:extLst>
+                  <a:ext uri="{0D108BD9-81ED-4DB2-BD59-A6C34878D82A}">
+                    <a16:rowId xmlns:a16="http://schemas.microsoft.com/office/drawing/2014/main" val="2456724200"/>
+                  </a:ext>
+                </a:extLst>
+              </a:tr>
+              <a:tr h="370840">
+                <a:tc>
+                  <a:txBody>
+                    <a:bodyPr/>
+                    <a:lstStyle/>
+                    <a:p>
+                      <a:pPr fontAlgn="t"/>
+                      <a:r>
+                        <a:rPr lang="en-US" u="none" strike="noStrike" dirty="0">
+                          <a:solidFill>
+                            <a:srgbClr val="1E73BE"/>
+                          </a:solidFill>
+                          <a:effectLst/>
+                          <a:hlinkClick r:id="rId3"/>
+                        </a:rPr>
+                        <a:t>Integration Testing</a:t>
+                      </a:r>
+                      <a:endParaRPr lang="en-US" dirty="0">
+                        <a:effectLst/>
+                      </a:endParaRPr>
+                    </a:p>
+                  </a:txBody>
+                  <a:tcPr marL="76200" marR="76200" marT="76200" marB="76200"/>
+                </a:tc>
+                <a:tc>
+                  <a:txBody>
+                    <a:bodyPr/>
+                    <a:lstStyle/>
+                    <a:p>
+                      <a:pPr fontAlgn="t"/>
+                      <a:r>
+                        <a:rPr lang="en-US">
+                          <a:effectLst/>
+                        </a:rPr>
+                        <a:t>A level of the software testing process where individual units are combined and tested as a group. The purpose of this level of testing is to expose faults in the interaction between integrated units.</a:t>
+                      </a:r>
+                    </a:p>
+                  </a:txBody>
+                  <a:tcPr marL="76200" marR="76200" marT="76200" marB="76200"/>
+                </a:tc>
+                <a:extLst>
+                  <a:ext uri="{0D108BD9-81ED-4DB2-BD59-A6C34878D82A}">
+                    <a16:rowId xmlns:a16="http://schemas.microsoft.com/office/drawing/2014/main" val="3528239780"/>
+                  </a:ext>
+                </a:extLst>
+              </a:tr>
+              <a:tr h="370840">
+                <a:tc>
+                  <a:txBody>
+                    <a:bodyPr/>
+                    <a:lstStyle/>
+                    <a:p>
+                      <a:pPr fontAlgn="t"/>
+                      <a:r>
+                        <a:rPr lang="en-US" u="none" strike="noStrike">
+                          <a:solidFill>
+                            <a:srgbClr val="1E73BE"/>
+                          </a:solidFill>
+                          <a:effectLst/>
+                          <a:hlinkClick r:id="rId4"/>
+                        </a:rPr>
+                        <a:t>System Testing</a:t>
+                      </a:r>
+                      <a:endParaRPr lang="en-US">
+                        <a:effectLst/>
+                      </a:endParaRPr>
+                    </a:p>
+                  </a:txBody>
+                  <a:tcPr marL="76200" marR="76200" marT="76200" marB="76200"/>
+                </a:tc>
+                <a:tc>
+                  <a:txBody>
+                    <a:bodyPr/>
+                    <a:lstStyle/>
+                    <a:p>
+                      <a:pPr fontAlgn="t"/>
+                      <a:r>
+                        <a:rPr lang="en-US">
+                          <a:effectLst/>
+                        </a:rPr>
+                        <a:t>A level of the software testing process where a complete, integrated system is tested. The purpose of this test is to evaluate the system’s compliance with the specified requirements.</a:t>
+                      </a:r>
+                    </a:p>
+                  </a:txBody>
+                  <a:tcPr marL="76200" marR="76200" marT="76200" marB="76200"/>
+                </a:tc>
+                <a:extLst>
+                  <a:ext uri="{0D108BD9-81ED-4DB2-BD59-A6C34878D82A}">
+                    <a16:rowId xmlns:a16="http://schemas.microsoft.com/office/drawing/2014/main" val="1585594101"/>
+                  </a:ext>
+                </a:extLst>
+              </a:tr>
+              <a:tr h="370840">
+                <a:tc>
+                  <a:txBody>
+                    <a:bodyPr/>
+                    <a:lstStyle/>
+                    <a:p>
+                      <a:pPr fontAlgn="t"/>
+                      <a:r>
+                        <a:rPr lang="en-US" u="none" strike="noStrike">
+                          <a:solidFill>
+                            <a:srgbClr val="1E73BE"/>
+                          </a:solidFill>
+                          <a:effectLst/>
+                          <a:hlinkClick r:id="rId5"/>
+                        </a:rPr>
+                        <a:t>Acceptance Testing</a:t>
+                      </a:r>
+                      <a:endParaRPr lang="en-US">
+                        <a:effectLst/>
+                      </a:endParaRPr>
+                    </a:p>
+                  </a:txBody>
+                  <a:tcPr marL="76200" marR="76200" marT="76200" marB="76200"/>
+                </a:tc>
+                <a:tc>
+                  <a:txBody>
+                    <a:bodyPr/>
+                    <a:lstStyle/>
+                    <a:p>
+                      <a:pPr fontAlgn="t"/>
+                      <a:r>
+                        <a:rPr lang="en-US" dirty="0">
+                          <a:effectLst/>
+                        </a:rPr>
+                        <a:t>A level of the software testing process where a system is tested for acceptability. The purpose of this test is to evaluate the system’s compliance with the business requirements and assess whether it is acceptable for delivery.</a:t>
+                      </a:r>
+                    </a:p>
+                  </a:txBody>
+                  <a:tcPr marL="76200" marR="76200" marT="76200" marB="76200"/>
+                </a:tc>
+                <a:extLst>
+                  <a:ext uri="{0D108BD9-81ED-4DB2-BD59-A6C34878D82A}">
+                    <a16:rowId xmlns:a16="http://schemas.microsoft.com/office/drawing/2014/main" val="238522677"/>
+                  </a:ext>
+                </a:extLst>
+              </a:tr>
+            </a:tbl>
+          </a:graphicData>
+        </a:graphic>
+      </p:graphicFrame>
     </p:spTree>
     <p:extLst>
       <p:ext uri="{BB962C8B-B14F-4D97-AF65-F5344CB8AC3E}">
         <p14:creationId xmlns:p14="http://schemas.microsoft.com/office/powerpoint/2010/main" val="1387980641"/>
+      </p:ext>
+    </p:extLst>
+  </p:cSld>
+  <p:clrMapOvr>
+    <a:masterClrMapping/>
+  </p:clrMapOvr>
+</p:sld>
+</file>
+
+<file path=ppt/slides/slide7.xml><?xml version="1.0" encoding="utf-8"?>
+<p:sld xmlns:a="http://schemas.openxmlformats.org/drawingml/2006/main" xmlns:r="http://schemas.openxmlformats.org/officeDocument/2006/relationships" xmlns:p="http://schemas.openxmlformats.org/presentationml/2006/main">
+  <p:cSld>
+    <p:spTree>
+      <p:nvGrpSpPr>
+        <p:cNvPr id="1" name=""/>
+        <p:cNvGrpSpPr/>
+        <p:nvPr/>
+      </p:nvGrpSpPr>
+      <p:grpSpPr>
+        <a:xfrm>
+          <a:off x="0" y="0"/>
+          <a:ext cx="0" cy="0"/>
+          <a:chOff x="0" y="0"/>
+          <a:chExt cx="0" cy="0"/>
+        </a:xfrm>
+      </p:grpSpPr>
+      <p:sp>
+        <p:nvSpPr>
+          <p:cNvPr id="2" name="Title 1">
+            <a:extLst>
+              <a:ext uri="{FF2B5EF4-FFF2-40B4-BE49-F238E27FC236}">
+                <a16:creationId xmlns:a16="http://schemas.microsoft.com/office/drawing/2014/main" id="{3EFE102F-7F89-498B-B5EC-C56F6EC833B4}"/>
+              </a:ext>
+            </a:extLst>
+          </p:cNvPr>
+          <p:cNvSpPr>
+            <a:spLocks noGrp="1"/>
+          </p:cNvSpPr>
+          <p:nvPr>
+            <p:ph type="title"/>
+          </p:nvPr>
+        </p:nvSpPr>
+        <p:spPr/>
+        <p:txBody>
+          <a:bodyPr/>
+          <a:lstStyle/>
+          <a:p>
+            <a:r>
+              <a:rPr lang="en-US" dirty="0"/>
+              <a:t>Level Of  Testing</a:t>
+            </a:r>
+          </a:p>
+        </p:txBody>
+      </p:sp>
+      <p:pic>
+        <p:nvPicPr>
+          <p:cNvPr id="4" name="Picture 2" descr="Test-Target">
+            <a:extLst>
+              <a:ext uri="{FF2B5EF4-FFF2-40B4-BE49-F238E27FC236}">
+                <a16:creationId xmlns:a16="http://schemas.microsoft.com/office/drawing/2014/main" id="{40BC22CC-F7BA-4905-A8E3-D4CB20D94BD4}"/>
+              </a:ext>
+            </a:extLst>
+          </p:cNvPr>
+          <p:cNvPicPr>
+            <a:picLocks noGrp="1" noChangeAspect="1" noChangeArrowheads="1"/>
+          </p:cNvPicPr>
+          <p:nvPr>
+            <p:ph idx="1"/>
+          </p:nvPr>
+        </p:nvPicPr>
+        <p:blipFill>
+          <a:blip r:embed="rId2">
+            <a:extLst>
+              <a:ext uri="{28A0092B-C50C-407E-A947-70E740481C1C}">
+                <a14:useLocalDpi xmlns:a14="http://schemas.microsoft.com/office/drawing/2010/main" val="0"/>
+              </a:ext>
+            </a:extLst>
+          </a:blip>
+          <a:stretch>
+            <a:fillRect/>
+          </a:stretch>
+        </p:blipFill>
+        <p:spPr bwMode="auto">
+          <a:xfrm>
+            <a:off x="5124047" y="2084832"/>
+            <a:ext cx="6675418" cy="4357227"/>
+          </a:xfrm>
+          <a:prstGeom prst="rect">
+            <a:avLst/>
+          </a:prstGeom>
+          <a:noFill/>
+          <a:extLst>
+            <a:ext uri="{909E8E84-426E-40DD-AFC4-6F175D3DCCD1}">
+              <a14:hiddenFill xmlns:a14="http://schemas.microsoft.com/office/drawing/2010/main">
+                <a:solidFill>
+                  <a:srgbClr val="FFFFFF"/>
+                </a:solidFill>
+              </a14:hiddenFill>
+            </a:ext>
+          </a:extLst>
+        </p:spPr>
+      </p:pic>
+      <p:pic>
+        <p:nvPicPr>
+          <p:cNvPr id="5" name="Picture 4">
+            <a:extLst>
+              <a:ext uri="{FF2B5EF4-FFF2-40B4-BE49-F238E27FC236}">
+                <a16:creationId xmlns:a16="http://schemas.microsoft.com/office/drawing/2014/main" id="{930CFE46-6EBE-44AE-A7A4-BA66984B2567}"/>
+              </a:ext>
+            </a:extLst>
+          </p:cNvPr>
+          <p:cNvPicPr>
+            <a:picLocks noChangeAspect="1"/>
+          </p:cNvPicPr>
+          <p:nvPr/>
+        </p:nvPicPr>
+        <p:blipFill>
+          <a:blip r:embed="rId3">
+            <a:extLst>
+              <a:ext uri="{28A0092B-C50C-407E-A947-70E740481C1C}">
+                <a14:useLocalDpi xmlns:a14="http://schemas.microsoft.com/office/drawing/2010/main" val="0"/>
+              </a:ext>
+            </a:extLst>
+          </a:blip>
+          <a:stretch>
+            <a:fillRect/>
+          </a:stretch>
+        </p:blipFill>
+        <p:spPr>
+          <a:xfrm>
+            <a:off x="929016" y="2084832"/>
+            <a:ext cx="3710571" cy="4357227"/>
+          </a:xfrm>
+          <a:prstGeom prst="rect">
+            <a:avLst/>
+          </a:prstGeom>
+        </p:spPr>
+      </p:pic>
+    </p:spTree>
+    <p:extLst>
+      <p:ext uri="{BB962C8B-B14F-4D97-AF65-F5344CB8AC3E}">
+        <p14:creationId xmlns:p14="http://schemas.microsoft.com/office/powerpoint/2010/main" val="1966713004"/>
+      </p:ext>
+    </p:extLst>
+  </p:cSld>
+  <p:clrMapOvr>
+    <a:masterClrMapping/>
+  </p:clrMapOvr>
+</p:sld>
+</file>
+
+<file path=ppt/slides/slide8.xml><?xml version="1.0" encoding="utf-8"?>
+<p:sld xmlns:a="http://schemas.openxmlformats.org/drawingml/2006/main" xmlns:r="http://schemas.openxmlformats.org/officeDocument/2006/relationships" xmlns:p="http://schemas.openxmlformats.org/presentationml/2006/main">
+  <p:cSld>
+    <p:spTree>
+      <p:nvGrpSpPr>
+        <p:cNvPr id="1" name=""/>
+        <p:cNvGrpSpPr/>
+        <p:nvPr/>
+      </p:nvGrpSpPr>
+      <p:grpSpPr>
+        <a:xfrm>
+          <a:off x="0" y="0"/>
+          <a:ext cx="0" cy="0"/>
+          <a:chOff x="0" y="0"/>
+          <a:chExt cx="0" cy="0"/>
+        </a:xfrm>
+      </p:grpSpPr>
+      <p:sp>
+        <p:nvSpPr>
+          <p:cNvPr id="2" name="Title 1">
+            <a:extLst>
+              <a:ext uri="{FF2B5EF4-FFF2-40B4-BE49-F238E27FC236}">
+                <a16:creationId xmlns:a16="http://schemas.microsoft.com/office/drawing/2014/main" id="{4F1EBB28-677E-409B-9FD5-5F3DAAF78C35}"/>
+              </a:ext>
+            </a:extLst>
+          </p:cNvPr>
+          <p:cNvSpPr>
+            <a:spLocks noGrp="1"/>
+          </p:cNvSpPr>
+          <p:nvPr>
+            <p:ph type="title"/>
+          </p:nvPr>
+        </p:nvSpPr>
+        <p:spPr/>
+        <p:txBody>
+          <a:bodyPr/>
+          <a:lstStyle/>
+          <a:p>
+            <a:r>
+              <a:rPr lang="en-US" dirty="0"/>
+              <a:t>Test Objectives</a:t>
+            </a:r>
+          </a:p>
+        </p:txBody>
+      </p:sp>
+      <p:pic>
+        <p:nvPicPr>
+          <p:cNvPr id="4" name="Picture 2" descr="Test-Objectives">
+            <a:extLst>
+              <a:ext uri="{FF2B5EF4-FFF2-40B4-BE49-F238E27FC236}">
+                <a16:creationId xmlns:a16="http://schemas.microsoft.com/office/drawing/2014/main" id="{E4C72C47-8125-44FB-97DF-7E558A78D853}"/>
+              </a:ext>
+            </a:extLst>
+          </p:cNvPr>
+          <p:cNvPicPr>
+            <a:picLocks noGrp="1" noChangeAspect="1" noChangeArrowheads="1"/>
+          </p:cNvPicPr>
+          <p:nvPr>
+            <p:ph idx="1"/>
+          </p:nvPr>
+        </p:nvPicPr>
+        <p:blipFill>
+          <a:blip r:embed="rId2">
+            <a:extLst>
+              <a:ext uri="{28A0092B-C50C-407E-A947-70E740481C1C}">
+                <a14:useLocalDpi xmlns:a14="http://schemas.microsoft.com/office/drawing/2010/main" val="0"/>
+              </a:ext>
+            </a:extLst>
+          </a:blip>
+          <a:stretch>
+            <a:fillRect/>
+          </a:stretch>
+        </p:blipFill>
+        <p:spPr bwMode="auto">
+          <a:xfrm>
+            <a:off x="581192" y="1929173"/>
+            <a:ext cx="5616685" cy="4685744"/>
+          </a:xfrm>
+          <a:prstGeom prst="rect">
+            <a:avLst/>
+          </a:prstGeom>
+          <a:noFill/>
+          <a:extLst>
+            <a:ext uri="{909E8E84-426E-40DD-AFC4-6F175D3DCCD1}">
+              <a14:hiddenFill xmlns:a14="http://schemas.microsoft.com/office/drawing/2010/main">
+                <a:solidFill>
+                  <a:srgbClr val="FFFFFF"/>
+                </a:solidFill>
+              </a14:hiddenFill>
+            </a:ext>
+          </a:extLst>
+        </p:spPr>
+      </p:pic>
+    </p:spTree>
+    <p:extLst>
+      <p:ext uri="{BB962C8B-B14F-4D97-AF65-F5344CB8AC3E}">
+        <p14:creationId xmlns:p14="http://schemas.microsoft.com/office/powerpoint/2010/main" val="60962580"/>
+      </p:ext>
+    </p:extLst>
+  </p:cSld>
+  <p:clrMapOvr>
+    <a:masterClrMapping/>
+  </p:clrMapOvr>
+</p:sld>
+</file>
+
+<file path=ppt/slides/slide9.xml><?xml version="1.0" encoding="utf-8"?>
+<p:sld xmlns:a="http://schemas.openxmlformats.org/drawingml/2006/main" xmlns:r="http://schemas.openxmlformats.org/officeDocument/2006/relationships" xmlns:p="http://schemas.openxmlformats.org/presentationml/2006/main">
+  <p:cSld>
+    <p:spTree>
+      <p:nvGrpSpPr>
+        <p:cNvPr id="1" name=""/>
+        <p:cNvGrpSpPr/>
+        <p:nvPr/>
+      </p:nvGrpSpPr>
+      <p:grpSpPr>
+        <a:xfrm>
+          <a:off x="0" y="0"/>
+          <a:ext cx="0" cy="0"/>
+          <a:chOff x="0" y="0"/>
+          <a:chExt cx="0" cy="0"/>
+        </a:xfrm>
+      </p:grpSpPr>
+      <p:sp>
+        <p:nvSpPr>
+          <p:cNvPr id="2" name="Title 1">
+            <a:extLst>
+              <a:ext uri="{FF2B5EF4-FFF2-40B4-BE49-F238E27FC236}">
+                <a16:creationId xmlns:a16="http://schemas.microsoft.com/office/drawing/2014/main" id="{10E31572-0161-430D-97EA-F3EBA1CCB890}"/>
+              </a:ext>
+            </a:extLst>
+          </p:cNvPr>
+          <p:cNvSpPr>
+            <a:spLocks noGrp="1"/>
+          </p:cNvSpPr>
+          <p:nvPr>
+            <p:ph type="title"/>
+          </p:nvPr>
+        </p:nvSpPr>
+        <p:spPr/>
+        <p:txBody>
+          <a:bodyPr/>
+          <a:lstStyle/>
+          <a:p>
+            <a:r>
+              <a:rPr lang="en-US" dirty="0"/>
+              <a:t>Who Tests</a:t>
+            </a:r>
+          </a:p>
+        </p:txBody>
+      </p:sp>
+      <p:pic>
+        <p:nvPicPr>
+          <p:cNvPr id="4" name="Picture 2" descr="Testers-By-Type-of-Test">
+            <a:extLst>
+              <a:ext uri="{FF2B5EF4-FFF2-40B4-BE49-F238E27FC236}">
+                <a16:creationId xmlns:a16="http://schemas.microsoft.com/office/drawing/2014/main" id="{992344FD-F7CB-4A71-B8AB-B0D57D1226F4}"/>
+              </a:ext>
+            </a:extLst>
+          </p:cNvPr>
+          <p:cNvPicPr>
+            <a:picLocks noChangeAspect="1" noChangeArrowheads="1"/>
+          </p:cNvPicPr>
+          <p:nvPr/>
+        </p:nvPicPr>
+        <p:blipFill>
+          <a:blip r:embed="rId2">
+            <a:extLst>
+              <a:ext uri="{28A0092B-C50C-407E-A947-70E740481C1C}">
+                <a14:useLocalDpi xmlns:a14="http://schemas.microsoft.com/office/drawing/2010/main" val="0"/>
+              </a:ext>
+            </a:extLst>
+          </a:blip>
+          <a:srcRect/>
+          <a:stretch>
+            <a:fillRect/>
+          </a:stretch>
+        </p:blipFill>
+        <p:spPr bwMode="auto">
+          <a:xfrm>
+            <a:off x="581192" y="2465546"/>
+            <a:ext cx="11010748" cy="3366087"/>
+          </a:xfrm>
+          <a:prstGeom prst="rect">
+            <a:avLst/>
+          </a:prstGeom>
+          <a:noFill/>
+          <a:extLst>
+            <a:ext uri="{909E8E84-426E-40DD-AFC4-6F175D3DCCD1}">
+              <a14:hiddenFill xmlns:a14="http://schemas.microsoft.com/office/drawing/2010/main">
+                <a:solidFill>
+                  <a:srgbClr val="FFFFFF"/>
+                </a:solidFill>
+              </a14:hiddenFill>
+            </a:ext>
+          </a:extLst>
+        </p:spPr>
+      </p:pic>
+    </p:spTree>
+    <p:extLst>
+      <p:ext uri="{BB962C8B-B14F-4D97-AF65-F5344CB8AC3E}">
+        <p14:creationId xmlns:p14="http://schemas.microsoft.com/office/powerpoint/2010/main" val="2970506671"/>
       </p:ext>
     </p:extLst>
   </p:cSld>

</xml_diff>

<commit_message>
add assignment unit test
</commit_message>
<xml_diff>
--- a/unit test/Unit test.pptx
+++ b/unit test/Unit test.pptx
@@ -372,7 +372,7 @@
             <a:fld id="{B61BEF0D-F0BB-DE4B-95CE-6DB70DBA9567}" type="datetimeFigureOut">
               <a:rPr lang="en-US" dirty="0"/>
               <a:pPr/>
-              <a:t>10/3/2018</a:t>
+              <a:t>10/4/2018</a:t>
             </a:fld>
             <a:endParaRPr lang="en-US" dirty="0"/>
           </a:p>
@@ -631,7 +631,7 @@
             <a:fld id="{B61BEF0D-F0BB-DE4B-95CE-6DB70DBA9567}" type="datetimeFigureOut">
               <a:rPr lang="en-US" dirty="0"/>
               <a:pPr/>
-              <a:t>10/3/2018</a:t>
+              <a:t>10/4/2018</a:t>
             </a:fld>
             <a:endParaRPr lang="en-US" dirty="0"/>
           </a:p>
@@ -863,7 +863,7 @@
             <a:fld id="{B61BEF0D-F0BB-DE4B-95CE-6DB70DBA9567}" type="datetimeFigureOut">
               <a:rPr lang="en-US" dirty="0"/>
               <a:pPr/>
-              <a:t>10/3/2018</a:t>
+              <a:t>10/4/2018</a:t>
             </a:fld>
             <a:endParaRPr lang="en-US" dirty="0"/>
           </a:p>
@@ -1100,7 +1100,7 @@
             <a:fld id="{B61BEF0D-F0BB-DE4B-95CE-6DB70DBA9567}" type="datetimeFigureOut">
               <a:rPr lang="en-US" dirty="0"/>
               <a:pPr/>
-              <a:t>10/3/2018</a:t>
+              <a:t>10/4/2018</a:t>
             </a:fld>
             <a:endParaRPr lang="en-US" dirty="0"/>
           </a:p>
@@ -1404,7 +1404,7 @@
             <a:fld id="{B61BEF0D-F0BB-DE4B-95CE-6DB70DBA9567}" type="datetimeFigureOut">
               <a:rPr lang="en-US" dirty="0"/>
               <a:pPr/>
-              <a:t>10/3/2018</a:t>
+              <a:t>10/4/2018</a:t>
             </a:fld>
             <a:endParaRPr lang="en-US" dirty="0"/>
           </a:p>
@@ -1703,7 +1703,7 @@
             <a:fld id="{B61BEF0D-F0BB-DE4B-95CE-6DB70DBA9567}" type="datetimeFigureOut">
               <a:rPr lang="en-US" dirty="0"/>
               <a:pPr/>
-              <a:t>10/3/2018</a:t>
+              <a:t>10/4/2018</a:t>
             </a:fld>
             <a:endParaRPr lang="en-US" dirty="0"/>
           </a:p>
@@ -2122,7 +2122,7 @@
             <a:fld id="{B61BEF0D-F0BB-DE4B-95CE-6DB70DBA9567}" type="datetimeFigureOut">
               <a:rPr lang="en-US" dirty="0"/>
               <a:pPr/>
-              <a:t>10/3/2018</a:t>
+              <a:t>10/4/2018</a:t>
             </a:fld>
             <a:endParaRPr lang="en-US" dirty="0"/>
           </a:p>
@@ -2281,7 +2281,7 @@
             <a:fld id="{B61BEF0D-F0BB-DE4B-95CE-6DB70DBA9567}" type="datetimeFigureOut">
               <a:rPr lang="en-US" dirty="0"/>
               <a:pPr/>
-              <a:t>10/3/2018</a:t>
+              <a:t>10/4/2018</a:t>
             </a:fld>
             <a:endParaRPr lang="en-US" dirty="0"/>
           </a:p>
@@ -2373,7 +2373,7 @@
             <a:fld id="{B61BEF0D-F0BB-DE4B-95CE-6DB70DBA9567}" type="datetimeFigureOut">
               <a:rPr lang="en-US" dirty="0"/>
               <a:pPr/>
-              <a:t>10/3/2018</a:t>
+              <a:t>10/4/2018</a:t>
             </a:fld>
             <a:endParaRPr lang="en-US" dirty="0"/>
           </a:p>
@@ -2748,7 +2748,7 @@
             <a:fld id="{B61BEF0D-F0BB-DE4B-95CE-6DB70DBA9567}" type="datetimeFigureOut">
               <a:rPr lang="en-US" dirty="0"/>
               <a:pPr/>
-              <a:t>10/3/2018</a:t>
+              <a:t>10/4/2018</a:t>
             </a:fld>
             <a:endParaRPr lang="en-US" dirty="0"/>
           </a:p>
@@ -3034,7 +3034,7 @@
             <a:fld id="{B61BEF0D-F0BB-DE4B-95CE-6DB70DBA9567}" type="datetimeFigureOut">
               <a:rPr lang="en-US" dirty="0"/>
               <a:pPr/>
-              <a:t>10/3/2018</a:t>
+              <a:t>10/4/2018</a:t>
             </a:fld>
             <a:endParaRPr lang="en-US" dirty="0"/>
           </a:p>
@@ -3242,7 +3242,7 @@
             <a:fld id="{B61BEF0D-F0BB-DE4B-95CE-6DB70DBA9567}" type="datetimeFigureOut">
               <a:rPr lang="en-US" dirty="0"/>
               <a:pPr/>
-              <a:t>10/3/2018</a:t>
+              <a:t>10/4/2018</a:t>
             </a:fld>
             <a:endParaRPr lang="en-US" dirty="0"/>
           </a:p>
@@ -4643,18 +4643,43 @@
             <a:pPr lvl="1"/>
             <a:r>
               <a:rPr lang="en-US" dirty="0"/>
-              <a:t>Create class and implement some methods</a:t>
-            </a:r>
-          </a:p>
-          <a:p>
-            <a:r>
-              <a:rPr lang="en-US" dirty="0"/>
-              <a:t>Write unit test for each methods try to </a:t>
-            </a:r>
-            <a:r>
-              <a:rPr lang="en-US"/>
-              <a:t>coverage case </a:t>
-            </a:r>
+              <a:t>Create class and implement</a:t>
+            </a:r>
+            <a:r>
+              <a:rPr lang="th-TH" dirty="0"/>
+              <a:t> </a:t>
+            </a:r>
+            <a:r>
+              <a:rPr lang="en-US" dirty="0"/>
+              <a:t>code following file assignment</a:t>
+            </a:r>
+          </a:p>
+          <a:p>
+            <a:r>
+              <a:rPr lang="en-US" dirty="0"/>
+              <a:t>Write unit test for each methods coverage case </a:t>
+            </a:r>
+          </a:p>
+          <a:p>
+            <a:r>
+              <a:rPr lang="en-US" dirty="0"/>
+              <a:t>Create new branch name “unit-test”</a:t>
+            </a:r>
+          </a:p>
+          <a:p>
+            <a:r>
+              <a:rPr lang="en-US" dirty="0"/>
+              <a:t>Add folder “Unit test” and add all file (solution + unit test project + class library) in folder “Unit test” commit push to branch unit-test</a:t>
+            </a:r>
+          </a:p>
+          <a:p>
+            <a:r>
+              <a:rPr lang="en-US" dirty="0"/>
+              <a:t>Merge branch unit-test to master</a:t>
+            </a:r>
+          </a:p>
+          <a:p>
+            <a:endParaRPr lang="en-US" dirty="0"/>
           </a:p>
         </p:txBody>
       </p:sp>

</xml_diff>